<commit_message>
Commit of files after presentation
</commit_message>
<xml_diff>
--- a/DPS 2018/Corruption/DatabaseCorruption.pptx
+++ b/DPS 2018/Corruption/DatabaseCorruption.pptx
@@ -5,7 +5,7 @@
     <p:sldMasterId id="2147483648" r:id="rId1"/>
   </p:sldMasterIdLst>
   <p:notesMasterIdLst>
-    <p:notesMasterId r:id="rId21"/>
+    <p:notesMasterId r:id="rId20"/>
   </p:notesMasterIdLst>
   <p:sldIdLst>
     <p:sldId id="256" r:id="rId2"/>
@@ -19,14 +19,13 @@
     <p:sldId id="285" r:id="rId10"/>
     <p:sldId id="286" r:id="rId11"/>
     <p:sldId id="280" r:id="rId12"/>
-    <p:sldId id="263" r:id="rId13"/>
-    <p:sldId id="274" r:id="rId14"/>
-    <p:sldId id="259" r:id="rId15"/>
-    <p:sldId id="279" r:id="rId16"/>
-    <p:sldId id="277" r:id="rId17"/>
-    <p:sldId id="278" r:id="rId18"/>
-    <p:sldId id="267" r:id="rId19"/>
-    <p:sldId id="264" r:id="rId20"/>
+    <p:sldId id="274" r:id="rId13"/>
+    <p:sldId id="259" r:id="rId14"/>
+    <p:sldId id="279" r:id="rId15"/>
+    <p:sldId id="277" r:id="rId16"/>
+    <p:sldId id="278" r:id="rId17"/>
+    <p:sldId id="267" r:id="rId18"/>
+    <p:sldId id="264" r:id="rId19"/>
   </p:sldIdLst>
   <p:sldSz cx="12184063" cy="6858000"/>
   <p:notesSz cx="6858000" cy="9144000"/>
@@ -226,7 +225,7 @@
           <a:p>
             <a:fld id="{21B830E1-4837-4B56-9C60-6476C32AB27E}" type="datetimeFigureOut">
               <a:rPr lang="en-AU" smtClean="0"/>
-              <a:t>6/08/2018</a:t>
+              <a:t>11/08/2018</a:t>
             </a:fld>
             <a:endParaRPr lang="en-AU"/>
           </a:p>
@@ -643,7 +642,7 @@
           <a:p>
             <a:fld id="{A6DE6872-B327-4DE0-801B-AA3C105FBA3C}" type="slidenum">
               <a:rPr lang="en-AU" smtClean="0"/>
-              <a:t>15</a:t>
+              <a:t>14</a:t>
             </a:fld>
             <a:endParaRPr lang="en-AU"/>
           </a:p>
@@ -1739,7 +1738,7 @@
           <a:p>
             <a:fld id="{A6DE6872-B327-4DE0-801B-AA3C105FBA3C}" type="slidenum">
               <a:rPr lang="en-AU" smtClean="0"/>
-              <a:t>13</a:t>
+              <a:t>12</a:t>
             </a:fld>
             <a:endParaRPr lang="en-AU"/>
           </a:p>
@@ -6691,103 +6690,6 @@
       </p:grpSpPr>
       <p:sp>
         <p:nvSpPr>
-          <p:cNvPr id="5" name="Title 4"/>
-          <p:cNvSpPr>
-            <a:spLocks noGrp="1"/>
-          </p:cNvSpPr>
-          <p:nvPr>
-            <p:ph type="title"/>
-          </p:nvPr>
-        </p:nvSpPr>
-        <p:spPr/>
-        <p:txBody>
-          <a:bodyPr>
-            <a:normAutofit/>
-          </a:bodyPr>
-          <a:lstStyle/>
-          <a:p>
-            <a:r>
-              <a:rPr lang="en-IN" dirty="0"/>
-              <a:t>Binary Translation of Data</a:t>
-            </a:r>
-          </a:p>
-        </p:txBody>
-      </p:sp>
-      <p:sp>
-        <p:nvSpPr>
-          <p:cNvPr id="6" name="Content Placeholder 5"/>
-          <p:cNvSpPr>
-            <a:spLocks noGrp="1"/>
-          </p:cNvSpPr>
-          <p:nvPr>
-            <p:ph sz="half" idx="1"/>
-          </p:nvPr>
-        </p:nvSpPr>
-        <p:spPr/>
-        <p:txBody>
-          <a:bodyPr/>
-          <a:lstStyle/>
-          <a:p>
-            <a:r>
-              <a:rPr lang="en-IN" b="1" dirty="0"/>
-              <a:t>Use this layout to show software code</a:t>
-            </a:r>
-          </a:p>
-          <a:p>
-            <a:r>
-              <a:rPr lang="en-IN" sz="2200" dirty="0"/>
-              <a:t>The font is Consolas, a </a:t>
-            </a:r>
-            <a:r>
-              <a:rPr lang="en-IN" sz="2200" dirty="0" err="1"/>
-              <a:t>monospace</a:t>
-            </a:r>
-            <a:r>
-              <a:rPr lang="en-IN" sz="2200" dirty="0"/>
-              <a:t> font</a:t>
-            </a:r>
-          </a:p>
-          <a:p>
-            <a:r>
-              <a:rPr lang="en-IN" sz="2200" dirty="0"/>
-              <a:t>The slide doesn’t use bullets but levels can be indented using the “Increase List Level” icon on the Home menu</a:t>
-            </a:r>
-          </a:p>
-          <a:p>
-            <a:endParaRPr lang="en-IN" dirty="0"/>
-          </a:p>
-          <a:p>
-            <a:endParaRPr lang="en-IN" dirty="0"/>
-          </a:p>
-        </p:txBody>
-      </p:sp>
-    </p:spTree>
-  </p:cSld>
-  <p:clrMapOvr>
-    <a:masterClrMapping/>
-  </p:clrMapOvr>
-</p:sld>
-</file>
-
-<file path=ppt/slides/slide13.xml><?xml version="1.0" encoding="utf-8"?>
-<p:sld xmlns:a="http://schemas.openxmlformats.org/drawingml/2006/main" xmlns:r="http://schemas.openxmlformats.org/officeDocument/2006/relationships" xmlns:p="http://schemas.openxmlformats.org/presentationml/2006/main">
-  <p:cSld>
-    <p:spTree>
-      <p:nvGrpSpPr>
-        <p:cNvPr id="1" name=""/>
-        <p:cNvGrpSpPr/>
-        <p:nvPr/>
-      </p:nvGrpSpPr>
-      <p:grpSpPr>
-        <a:xfrm>
-          <a:off x="0" y="0"/>
-          <a:ext cx="0" cy="0"/>
-          <a:chOff x="0" y="0"/>
-          <a:chExt cx="0" cy="0"/>
-        </a:xfrm>
-      </p:grpSpPr>
-      <p:sp>
-        <p:nvSpPr>
           <p:cNvPr id="2" name="Title 1"/>
           <p:cNvSpPr>
             <a:spLocks noGrp="1"/>
@@ -6845,7 +6747,7 @@
 </p:sld>
 </file>
 
-<file path=ppt/slides/slide14.xml><?xml version="1.0" encoding="utf-8"?>
+<file path=ppt/slides/slide13.xml><?xml version="1.0" encoding="utf-8"?>
 <p:sld xmlns:a="http://schemas.openxmlformats.org/drawingml/2006/main" xmlns:r="http://schemas.openxmlformats.org/officeDocument/2006/relationships" xmlns:p="http://schemas.openxmlformats.org/presentationml/2006/main">
   <p:cSld>
     <p:spTree>
@@ -6893,7 +6795,7 @@
 </p:sld>
 </file>
 
-<file path=ppt/slides/slide15.xml><?xml version="1.0" encoding="utf-8"?>
+<file path=ppt/slides/slide14.xml><?xml version="1.0" encoding="utf-8"?>
 <p:sld xmlns:a="http://schemas.openxmlformats.org/drawingml/2006/main" xmlns:r="http://schemas.openxmlformats.org/officeDocument/2006/relationships" xmlns:p="http://schemas.openxmlformats.org/presentationml/2006/main">
   <p:cSld>
     <p:spTree>
@@ -7521,6 +7423,180 @@
 </p:sld>
 </file>
 
+<file path=ppt/slides/slide15.xml><?xml version="1.0" encoding="utf-8"?>
+<p:sld xmlns:a="http://schemas.openxmlformats.org/drawingml/2006/main" xmlns:r="http://schemas.openxmlformats.org/officeDocument/2006/relationships" xmlns:p="http://schemas.openxmlformats.org/presentationml/2006/main">
+  <p:cSld>
+    <p:spTree>
+      <p:nvGrpSpPr>
+        <p:cNvPr id="1" name=""/>
+        <p:cNvGrpSpPr/>
+        <p:nvPr/>
+      </p:nvGrpSpPr>
+      <p:grpSpPr>
+        <a:xfrm>
+          <a:off x="0" y="0"/>
+          <a:ext cx="0" cy="0"/>
+          <a:chOff x="0" y="0"/>
+          <a:chExt cx="0" cy="0"/>
+        </a:xfrm>
+      </p:grpSpPr>
+      <p:sp>
+        <p:nvSpPr>
+          <p:cNvPr id="2" name="Title 1"/>
+          <p:cNvSpPr>
+            <a:spLocks noGrp="1"/>
+          </p:cNvSpPr>
+          <p:nvPr>
+            <p:ph type="title"/>
+          </p:nvPr>
+        </p:nvSpPr>
+        <p:spPr/>
+        <p:txBody>
+          <a:bodyPr/>
+          <a:lstStyle/>
+          <a:p>
+            <a:r>
+              <a:rPr lang="en-AU" dirty="0"/>
+              <a:t>Resources</a:t>
+            </a:r>
+          </a:p>
+        </p:txBody>
+      </p:sp>
+      <p:sp>
+        <p:nvSpPr>
+          <p:cNvPr id="3" name="Content Placeholder 2"/>
+          <p:cNvSpPr>
+            <a:spLocks noGrp="1"/>
+          </p:cNvSpPr>
+          <p:nvPr>
+            <p:ph idx="1"/>
+          </p:nvPr>
+        </p:nvSpPr>
+        <p:spPr/>
+        <p:txBody>
+          <a:bodyPr/>
+          <a:lstStyle/>
+          <a:p>
+            <a:r>
+              <a:rPr lang="en-AU" dirty="0"/>
+              <a:t>Steve Stedman Corruption Challenge</a:t>
+            </a:r>
+          </a:p>
+          <a:p>
+            <a:r>
+              <a:rPr lang="en-AU" sz="1399" dirty="0"/>
+              <a:t>	</a:t>
+            </a:r>
+            <a:r>
+              <a:rPr lang="en-AU" sz="1399" dirty="0">
+                <a:hlinkClick r:id="rId2"/>
+              </a:rPr>
+              <a:t>http://stevestedman.com/category/corruption</a:t>
+            </a:r>
+            <a:endParaRPr lang="en-AU" sz="1399" dirty="0"/>
+          </a:p>
+          <a:p>
+            <a:r>
+              <a:rPr lang="en-AU" dirty="0"/>
+              <a:t>SQL Skills – Paul S Randal</a:t>
+            </a:r>
+          </a:p>
+          <a:p>
+            <a:r>
+              <a:rPr lang="en-AU" sz="1399" dirty="0"/>
+              <a:t>	</a:t>
+            </a:r>
+            <a:r>
+              <a:rPr lang="en-AU" sz="1399" dirty="0">
+                <a:hlinkClick r:id="rId3"/>
+              </a:rPr>
+              <a:t>http://www.sqlskills.com/blogs/paul/category/checkdb-from-every-angle</a:t>
+            </a:r>
+            <a:endParaRPr lang="en-AU" sz="1399" dirty="0"/>
+          </a:p>
+          <a:p>
+            <a:r>
+              <a:rPr lang="en-AU" dirty="0" err="1"/>
+              <a:t>SQLSoldier</a:t>
+            </a:r>
+            <a:r>
+              <a:rPr lang="en-AU" dirty="0"/>
+              <a:t> - Robert Davis</a:t>
+            </a:r>
+          </a:p>
+          <a:p>
+            <a:r>
+              <a:rPr lang="en-AU" sz="1399" dirty="0">
+                <a:hlinkClick r:id="rId4"/>
+              </a:rPr>
+              <a:t>http://www.sqlsoldier.com/wp/tag/31daysofdisasterrecovery</a:t>
+            </a:r>
+            <a:endParaRPr lang="en-AU" sz="1399" dirty="0"/>
+          </a:p>
+          <a:p>
+            <a:r>
+              <a:rPr lang="en-AU" dirty="0"/>
+              <a:t>Minion Software – Backups and </a:t>
+            </a:r>
+            <a:r>
+              <a:rPr lang="en-AU" dirty="0" err="1"/>
+              <a:t>CheckDB</a:t>
+            </a:r>
+            <a:endParaRPr lang="en-AU" dirty="0"/>
+          </a:p>
+          <a:p>
+            <a:r>
+              <a:rPr lang="en-AU" dirty="0"/>
+              <a:t>	</a:t>
+            </a:r>
+            <a:r>
+              <a:rPr lang="en-AU" sz="1399" dirty="0">
+                <a:hlinkClick r:id="rId5"/>
+              </a:rPr>
+              <a:t>http://minionware.net/backup</a:t>
+            </a:r>
+            <a:endParaRPr lang="en-AU" sz="1399" dirty="0"/>
+          </a:p>
+          <a:p>
+            <a:r>
+              <a:rPr lang="en-AU" sz="1399" dirty="0"/>
+              <a:t>	</a:t>
+            </a:r>
+            <a:r>
+              <a:rPr lang="en-AU" sz="1399" dirty="0">
+                <a:hlinkClick r:id="rId6"/>
+              </a:rPr>
+              <a:t>http://minionware.net/checkdb</a:t>
+            </a:r>
+            <a:endParaRPr lang="en-AU" sz="1399" dirty="0"/>
+          </a:p>
+          <a:p>
+            <a:r>
+              <a:rPr lang="en-AU" sz="1399" dirty="0"/>
+              <a:t>	</a:t>
+            </a:r>
+          </a:p>
+          <a:p>
+            <a:endParaRPr lang="en-AU" sz="1399" dirty="0"/>
+          </a:p>
+          <a:p>
+            <a:endParaRPr lang="en-AU" sz="1399" dirty="0"/>
+          </a:p>
+        </p:txBody>
+      </p:sp>
+    </p:spTree>
+    <p:extLst>
+      <p:ext uri="{BB962C8B-B14F-4D97-AF65-F5344CB8AC3E}">
+        <p14:creationId xmlns:p14="http://schemas.microsoft.com/office/powerpoint/2010/main" val="2120934370"/>
+      </p:ext>
+    </p:extLst>
+  </p:cSld>
+  <p:clrMapOvr>
+    <a:masterClrMapping/>
+  </p:clrMapOvr>
+</p:sld>
+</file>
+
 <file path=ppt/slides/slide16.xml><?xml version="1.0" encoding="utf-8"?>
 <p:sld xmlns:a="http://schemas.openxmlformats.org/drawingml/2006/main" xmlns:r="http://schemas.openxmlformats.org/officeDocument/2006/relationships" xmlns:p="http://schemas.openxmlformats.org/presentationml/2006/main">
   <p:cSld>
@@ -7555,7 +7631,7 @@
           <a:p>
             <a:r>
               <a:rPr lang="en-AU" dirty="0"/>
-              <a:t>Resources</a:t>
+              <a:t>Resources cont.</a:t>
             </a:r>
           </a:p>
         </p:txBody>
@@ -7577,26 +7653,22 @@
           <a:p>
             <a:r>
               <a:rPr lang="en-AU" dirty="0"/>
-              <a:t>Steve Stedman Corruption Challenge</a:t>
-            </a:r>
-          </a:p>
-          <a:p>
-            <a:r>
-              <a:rPr lang="en-AU" sz="1399" dirty="0"/>
-              <a:t>	</a:t>
-            </a:r>
+              <a:t>ORCA MDF – Mark S Rasmussen</a:t>
+            </a:r>
+          </a:p>
+          <a:p>
             <a:r>
               <a:rPr lang="en-AU" sz="1399" dirty="0">
                 <a:hlinkClick r:id="rId2"/>
               </a:rPr>
-              <a:t>http://stevestedman.com/category/corruption</a:t>
+              <a:t>http://improve.dk/category/SQL%20Server%20-%20OrcaMDF/</a:t>
             </a:r>
             <a:endParaRPr lang="en-AU" sz="1399" dirty="0"/>
           </a:p>
           <a:p>
             <a:r>
               <a:rPr lang="en-AU" dirty="0"/>
-              <a:t>SQL Skills – Paul S Randal</a:t>
+              <a:t>Hex Editors </a:t>
             </a:r>
           </a:p>
           <a:p>
@@ -7608,71 +7680,62 @@
               <a:rPr lang="en-AU" sz="1399" dirty="0">
                 <a:hlinkClick r:id="rId3"/>
               </a:rPr>
-              <a:t>http://www.sqlskills.com/blogs/paul/category/checkdb-from-every-angle</a:t>
+              <a:t>http://xvi32.en.softonic.com/download</a:t>
             </a:r>
             <a:endParaRPr lang="en-AU" sz="1399" dirty="0"/>
           </a:p>
           <a:p>
             <a:r>
-              <a:rPr lang="en-AU" dirty="0" err="1"/>
-              <a:t>SQLSoldier</a:t>
-            </a:r>
-            <a:r>
-              <a:rPr lang="en-AU" dirty="0"/>
-              <a:t> - Robert Davis</a:t>
-            </a:r>
-          </a:p>
-          <a:p>
+              <a:rPr lang="en-AU" sz="1399" dirty="0"/>
+              <a:t>	</a:t>
+            </a:r>
             <a:r>
               <a:rPr lang="en-AU" sz="1399" dirty="0">
                 <a:hlinkClick r:id="rId4"/>
               </a:rPr>
-              <a:t>http://www.sqlsoldier.com/wp/tag/31daysofdisasterrecovery</a:t>
+              <a:t>https://mh-nexus.de/en/hxd/</a:t>
             </a:r>
             <a:endParaRPr lang="en-AU" sz="1399" dirty="0"/>
           </a:p>
           <a:p>
+            <a:endParaRPr lang="en-AU" sz="1399" dirty="0"/>
+          </a:p>
+          <a:p>
+            <a:r>
+              <a:rPr lang="en-AU" dirty="0" err="1"/>
+              <a:t>Pluralsight</a:t>
+            </a:r>
             <a:r>
               <a:rPr lang="en-AU" dirty="0"/>
-              <a:t>Minion Software – Backups and </a:t>
-            </a:r>
-            <a:r>
-              <a:rPr lang="en-AU" dirty="0" err="1"/>
-              <a:t>CheckDB</a:t>
-            </a:r>
-            <a:endParaRPr lang="en-AU" dirty="0"/>
-          </a:p>
-          <a:p>
-            <a:r>
-              <a:rPr lang="en-AU" dirty="0"/>
+              <a:t> </a:t>
+            </a:r>
+          </a:p>
+          <a:p>
+            <a:r>
+              <a:rPr lang="en-AU" sz="1399" dirty="0"/>
               <a:t>	</a:t>
             </a:r>
             <a:r>
-              <a:rPr lang="en-AU" sz="1399" dirty="0">
+              <a:rPr lang="en-AU" sz="1399" b="1" dirty="0"/>
+              <a:t>SQL Server: Detecting and Correcting Database Corruption</a:t>
+            </a:r>
+            <a:endParaRPr lang="en-AU" sz="1399" dirty="0"/>
+          </a:p>
+          <a:p>
+            <a:r>
+              <a:rPr lang="en-AU" sz="1399" dirty="0"/>
+              <a:t>	</a:t>
+            </a:r>
+            <a:r>
+              <a:rPr lang="en-AU" sz="1399" b="1" dirty="0">
                 <a:hlinkClick r:id="rId5"/>
               </a:rPr>
-              <a:t>http://minionware.net/backup</a:t>
+              <a:t>SQL Server: Detecting and Recovering from Database Corruption</a:t>
             </a:r>
             <a:endParaRPr lang="en-AU" sz="1399" dirty="0"/>
           </a:p>
           <a:p>
-            <a:r>
-              <a:rPr lang="en-AU" sz="1399" dirty="0"/>
-              <a:t>	</a:t>
-            </a:r>
-            <a:r>
-              <a:rPr lang="en-AU" sz="1399" dirty="0">
-                <a:hlinkClick r:id="rId6"/>
-              </a:rPr>
-              <a:t>http://minionware.net/checkdb</a:t>
-            </a:r>
             <a:endParaRPr lang="en-AU" sz="1399" dirty="0"/>
-          </a:p>
-          <a:p>
-            <a:r>
-              <a:rPr lang="en-AU" sz="1399" dirty="0"/>
-              <a:t>	</a:t>
-            </a:r>
           </a:p>
           <a:p>
             <a:endParaRPr lang="en-AU" sz="1399" dirty="0"/>
@@ -7685,7 +7748,7 @@
     </p:spTree>
     <p:extLst>
       <p:ext uri="{BB962C8B-B14F-4D97-AF65-F5344CB8AC3E}">
-        <p14:creationId xmlns:p14="http://schemas.microsoft.com/office/powerpoint/2010/main" val="2120934370"/>
+        <p14:creationId xmlns:p14="http://schemas.microsoft.com/office/powerpoint/2010/main" val="3956999960"/>
       </p:ext>
     </p:extLst>
   </p:cSld>
@@ -7712,143 +7775,7 @@
           <a:chExt cx="0" cy="0"/>
         </a:xfrm>
       </p:grpSpPr>
-      <p:sp>
-        <p:nvSpPr>
-          <p:cNvPr id="2" name="Title 1"/>
-          <p:cNvSpPr>
-            <a:spLocks noGrp="1"/>
-          </p:cNvSpPr>
-          <p:nvPr>
-            <p:ph type="title"/>
-          </p:nvPr>
-        </p:nvSpPr>
-        <p:spPr/>
-        <p:txBody>
-          <a:bodyPr/>
-          <a:lstStyle/>
-          <a:p>
-            <a:r>
-              <a:rPr lang="en-AU" dirty="0"/>
-              <a:t>Resources cont.</a:t>
-            </a:r>
-          </a:p>
-        </p:txBody>
-      </p:sp>
-      <p:sp>
-        <p:nvSpPr>
-          <p:cNvPr id="3" name="Content Placeholder 2"/>
-          <p:cNvSpPr>
-            <a:spLocks noGrp="1"/>
-          </p:cNvSpPr>
-          <p:nvPr>
-            <p:ph idx="1"/>
-          </p:nvPr>
-        </p:nvSpPr>
-        <p:spPr/>
-        <p:txBody>
-          <a:bodyPr/>
-          <a:lstStyle/>
-          <a:p>
-            <a:r>
-              <a:rPr lang="en-AU" dirty="0"/>
-              <a:t>ORCA MDF – Mark S Rasmussen</a:t>
-            </a:r>
-          </a:p>
-          <a:p>
-            <a:r>
-              <a:rPr lang="en-AU" sz="1399" dirty="0">
-                <a:hlinkClick r:id="rId2"/>
-              </a:rPr>
-              <a:t>http://improve.dk/category/SQL%20Server%20-%20OrcaMDF/</a:t>
-            </a:r>
-            <a:endParaRPr lang="en-AU" sz="1399" dirty="0"/>
-          </a:p>
-          <a:p>
-            <a:r>
-              <a:rPr lang="en-AU" dirty="0"/>
-              <a:t>Hex Editors </a:t>
-            </a:r>
-          </a:p>
-          <a:p>
-            <a:r>
-              <a:rPr lang="en-AU" sz="1399" dirty="0"/>
-              <a:t>	</a:t>
-            </a:r>
-            <a:r>
-              <a:rPr lang="en-AU" sz="1399" dirty="0">
-                <a:hlinkClick r:id="rId3"/>
-              </a:rPr>
-              <a:t>http://xvi32.en.softonic.com/download</a:t>
-            </a:r>
-            <a:endParaRPr lang="en-AU" sz="1399" dirty="0"/>
-          </a:p>
-          <a:p>
-            <a:r>
-              <a:rPr lang="en-AU" sz="1399" dirty="0"/>
-              <a:t>	</a:t>
-            </a:r>
-            <a:r>
-              <a:rPr lang="en-AU" sz="1399" dirty="0">
-                <a:hlinkClick r:id="rId4"/>
-              </a:rPr>
-              <a:t>https://mh-nexus.de/en/hxd/</a:t>
-            </a:r>
-            <a:endParaRPr lang="en-AU" sz="1399" dirty="0"/>
-          </a:p>
-          <a:p>
-            <a:endParaRPr lang="en-AU" sz="1399" dirty="0"/>
-          </a:p>
-          <a:p>
-            <a:r>
-              <a:rPr lang="en-AU" dirty="0" err="1"/>
-              <a:t>Pluralsight</a:t>
-            </a:r>
-            <a:r>
-              <a:rPr lang="en-AU" dirty="0"/>
-              <a:t> </a:t>
-            </a:r>
-          </a:p>
-          <a:p>
-            <a:r>
-              <a:rPr lang="en-AU" sz="1399" dirty="0"/>
-              <a:t>	</a:t>
-            </a:r>
-            <a:r>
-              <a:rPr lang="en-AU" sz="1399" b="1" dirty="0"/>
-              <a:t>SQL Server: Detecting and Correcting Database Corruption</a:t>
-            </a:r>
-            <a:endParaRPr lang="en-AU" sz="1399" dirty="0"/>
-          </a:p>
-          <a:p>
-            <a:r>
-              <a:rPr lang="en-AU" sz="1399" dirty="0"/>
-              <a:t>	</a:t>
-            </a:r>
-            <a:r>
-              <a:rPr lang="en-AU" sz="1399" b="1" dirty="0">
-                <a:hlinkClick r:id="rId5"/>
-              </a:rPr>
-              <a:t>SQL Server: Detecting and Recovering from Database Corruption</a:t>
-            </a:r>
-            <a:endParaRPr lang="en-AU" sz="1399" dirty="0"/>
-          </a:p>
-          <a:p>
-            <a:endParaRPr lang="en-AU" sz="1399" dirty="0"/>
-          </a:p>
-          <a:p>
-            <a:endParaRPr lang="en-AU" sz="1399" dirty="0"/>
-          </a:p>
-          <a:p>
-            <a:endParaRPr lang="en-AU" sz="1399" dirty="0"/>
-          </a:p>
-        </p:txBody>
-      </p:sp>
     </p:spTree>
-    <p:extLst>
-      <p:ext uri="{BB962C8B-B14F-4D97-AF65-F5344CB8AC3E}">
-        <p14:creationId xmlns:p14="http://schemas.microsoft.com/office/powerpoint/2010/main" val="3956999960"/>
-      </p:ext>
-    </p:extLst>
   </p:cSld>
   <p:clrMapOvr>
     <a:masterClrMapping/>
@@ -7857,31 +7784,6 @@
 </file>
 
 <file path=ppt/slides/slide18.xml><?xml version="1.0" encoding="utf-8"?>
-<p:sld xmlns:a="http://schemas.openxmlformats.org/drawingml/2006/main" xmlns:r="http://schemas.openxmlformats.org/officeDocument/2006/relationships" xmlns:p="http://schemas.openxmlformats.org/presentationml/2006/main">
-  <p:cSld>
-    <p:spTree>
-      <p:nvGrpSpPr>
-        <p:cNvPr id="1" name=""/>
-        <p:cNvGrpSpPr/>
-        <p:nvPr/>
-      </p:nvGrpSpPr>
-      <p:grpSpPr>
-        <a:xfrm>
-          <a:off x="0" y="0"/>
-          <a:ext cx="0" cy="0"/>
-          <a:chOff x="0" y="0"/>
-          <a:chExt cx="0" cy="0"/>
-        </a:xfrm>
-      </p:grpSpPr>
-    </p:spTree>
-  </p:cSld>
-  <p:clrMapOvr>
-    <a:masterClrMapping/>
-  </p:clrMapOvr>
-</p:sld>
-</file>
-
-<file path=ppt/slides/slide19.xml><?xml version="1.0" encoding="utf-8"?>
 <p:sld xmlns:a="http://schemas.openxmlformats.org/drawingml/2006/main" xmlns:r="http://schemas.openxmlformats.org/officeDocument/2006/relationships" xmlns:p="http://schemas.openxmlformats.org/presentationml/2006/main">
   <p:cSld>
     <p:spTree>
@@ -8168,14 +8070,14 @@
           </a:ln>
           <a:extLst>
             <a:ext uri="{909E8E84-426E-40dd-AFC4-6F175D3DCCD1}">
-              <a14:hiddenFill xmlns:a14="http://schemas.microsoft.com/office/drawing/2010/main" xmlns="">
+              <a14:hiddenFill xmlns="" xmlns:a14="http://schemas.microsoft.com/office/drawing/2010/main">
                 <a:solidFill>
                   <a:srgbClr val="FFFFFF"/>
                 </a:solidFill>
               </a14:hiddenFill>
             </a:ext>
             <a:ext uri="{91240B29-F687-4f45-9708-019B960494DF}">
-              <a14:hiddenLine xmlns:a14="http://schemas.microsoft.com/office/drawing/2010/main" xmlns="" w="9525">
+              <a14:hiddenLine xmlns="" xmlns:a14="http://schemas.microsoft.com/office/drawing/2010/main" w="9525">
                 <a:solidFill>
                   <a:srgbClr val="000000"/>
                 </a:solidFill>
@@ -8215,14 +8117,14 @@
           </a:ln>
           <a:extLst>
             <a:ext uri="{909E8E84-426E-40dd-AFC4-6F175D3DCCD1}">
-              <a14:hiddenFill xmlns:a14="http://schemas.microsoft.com/office/drawing/2010/main" xmlns="">
+              <a14:hiddenFill xmlns="" xmlns:a14="http://schemas.microsoft.com/office/drawing/2010/main">
                 <a:solidFill>
                   <a:srgbClr val="FFFFFF"/>
                 </a:solidFill>
               </a14:hiddenFill>
             </a:ext>
             <a:ext uri="{91240B29-F687-4f45-9708-019B960494DF}">
-              <a14:hiddenLine xmlns:a14="http://schemas.microsoft.com/office/drawing/2010/main" xmlns="" w="9525">
+              <a14:hiddenLine xmlns="" xmlns:a14="http://schemas.microsoft.com/office/drawing/2010/main" w="9525">
                 <a:solidFill>
                   <a:srgbClr val="000000"/>
                 </a:solidFill>
@@ -8290,14 +8192,14 @@
           </a:ln>
           <a:extLst>
             <a:ext uri="{909E8E84-426E-40dd-AFC4-6F175D3DCCD1}">
-              <a14:hiddenFill xmlns:a14="http://schemas.microsoft.com/office/drawing/2010/main" xmlns="">
+              <a14:hiddenFill xmlns="" xmlns:a14="http://schemas.microsoft.com/office/drawing/2010/main">
                 <a:solidFill>
                   <a:srgbClr val="FFFFFF"/>
                 </a:solidFill>
               </a14:hiddenFill>
             </a:ext>
             <a:ext uri="{91240B29-F687-4f45-9708-019B960494DF}">
-              <a14:hiddenLine xmlns:a14="http://schemas.microsoft.com/office/drawing/2010/main" xmlns="" w="9525">
+              <a14:hiddenLine xmlns="" xmlns:a14="http://schemas.microsoft.com/office/drawing/2010/main" w="9525">
                 <a:solidFill>
                   <a:srgbClr val="000000"/>
                 </a:solidFill>
@@ -8373,14 +8275,14 @@
           </a:ln>
           <a:extLst>
             <a:ext uri="{909E8E84-426E-40dd-AFC4-6F175D3DCCD1}">
-              <a14:hiddenFill xmlns:a14="http://schemas.microsoft.com/office/drawing/2010/main" xmlns="">
+              <a14:hiddenFill xmlns="" xmlns:a14="http://schemas.microsoft.com/office/drawing/2010/main">
                 <a:solidFill>
                   <a:srgbClr val="FFFFFF"/>
                 </a:solidFill>
               </a14:hiddenFill>
             </a:ext>
             <a:ext uri="{91240B29-F687-4f45-9708-019B960494DF}">
-              <a14:hiddenLine xmlns:a14="http://schemas.microsoft.com/office/drawing/2010/main" xmlns="" w="9525">
+              <a14:hiddenLine xmlns="" xmlns:a14="http://schemas.microsoft.com/office/drawing/2010/main" w="9525">
                 <a:solidFill>
                   <a:srgbClr val="000000"/>
                 </a:solidFill>
@@ -8456,14 +8358,14 @@
           </a:ln>
           <a:extLst>
             <a:ext uri="{909E8E84-426E-40dd-AFC4-6F175D3DCCD1}">
-              <a14:hiddenFill xmlns:a14="http://schemas.microsoft.com/office/drawing/2010/main" xmlns="">
+              <a14:hiddenFill xmlns="" xmlns:a14="http://schemas.microsoft.com/office/drawing/2010/main">
                 <a:solidFill>
                   <a:srgbClr val="FFFFFF"/>
                 </a:solidFill>
               </a14:hiddenFill>
             </a:ext>
             <a:ext uri="{91240B29-F687-4f45-9708-019B960494DF}">
-              <a14:hiddenLine xmlns:a14="http://schemas.microsoft.com/office/drawing/2010/main" xmlns="" w="9525">
+              <a14:hiddenLine xmlns="" xmlns:a14="http://schemas.microsoft.com/office/drawing/2010/main" w="9525">
                 <a:solidFill>
                   <a:srgbClr val="000000"/>
                 </a:solidFill>
@@ -8490,7 +8392,7 @@
             </a:pPr>
             <a:r>
               <a:rPr lang="en-GB" sz="1692" dirty="0"/>
-              <a:t>sqlsaturday@sqllensman.com</a:t>
+              <a:t>dps2018@sqllensman.com</a:t>
             </a:r>
           </a:p>
         </p:txBody>
@@ -8576,7 +8478,7 @@
         <p:spPr>
           <a:xfrm>
             <a:off x="7139616" y="2636912"/>
-            <a:ext cx="3279831" cy="923330"/>
+            <a:ext cx="4569039" cy="1754326"/>
           </a:xfrm>
           <a:prstGeom prst="rect">
             <a:avLst/>
@@ -8603,6 +8505,21 @@
             <a:r>
               <a:rPr lang="en-AU" dirty="0"/>
               <a:t>Production DBA for 10+ years.</a:t>
+            </a:r>
+          </a:p>
+          <a:p>
+            <a:endParaRPr lang="en-AU" dirty="0"/>
+          </a:p>
+          <a:p>
+            <a:r>
+              <a:rPr lang="en-AU" dirty="0"/>
+              <a:t>All Presentations available at:</a:t>
+            </a:r>
+          </a:p>
+          <a:p>
+            <a:r>
+              <a:rPr lang="en-AU" dirty="0"/>
+              <a:t>https://github.com/sqllensman/Presentations</a:t>
             </a:r>
           </a:p>
         </p:txBody>

</xml_diff>

<commit_message>
Final Version of DPS2018 Demo
</commit_message>
<xml_diff>
--- a/DPS 2018/Corruption/DatabaseCorruption.pptx
+++ b/DPS 2018/Corruption/DatabaseCorruption.pptx
@@ -225,7 +225,7 @@
           <a:p>
             <a:fld id="{21B830E1-4837-4B56-9C60-6476C32AB27E}" type="datetimeFigureOut">
               <a:rPr lang="en-AU" smtClean="0"/>
-              <a:t>11/08/2018</a:t>
+              <a:t>12/08/2018</a:t>
             </a:fld>
             <a:endParaRPr lang="en-AU"/>
           </a:p>
@@ -8070,14 +8070,14 @@
           </a:ln>
           <a:extLst>
             <a:ext uri="{909E8E84-426E-40dd-AFC4-6F175D3DCCD1}">
-              <a14:hiddenFill xmlns="" xmlns:a14="http://schemas.microsoft.com/office/drawing/2010/main">
+              <a14:hiddenFill xmlns:a14="http://schemas.microsoft.com/office/drawing/2010/main" xmlns="">
                 <a:solidFill>
                   <a:srgbClr val="FFFFFF"/>
                 </a:solidFill>
               </a14:hiddenFill>
             </a:ext>
             <a:ext uri="{91240B29-F687-4f45-9708-019B960494DF}">
-              <a14:hiddenLine xmlns="" xmlns:a14="http://schemas.microsoft.com/office/drawing/2010/main" w="9525">
+              <a14:hiddenLine xmlns:a14="http://schemas.microsoft.com/office/drawing/2010/main" xmlns="" w="9525">
                 <a:solidFill>
                   <a:srgbClr val="000000"/>
                 </a:solidFill>
@@ -8117,14 +8117,14 @@
           </a:ln>
           <a:extLst>
             <a:ext uri="{909E8E84-426E-40dd-AFC4-6F175D3DCCD1}">
-              <a14:hiddenFill xmlns="" xmlns:a14="http://schemas.microsoft.com/office/drawing/2010/main">
+              <a14:hiddenFill xmlns:a14="http://schemas.microsoft.com/office/drawing/2010/main" xmlns="">
                 <a:solidFill>
                   <a:srgbClr val="FFFFFF"/>
                 </a:solidFill>
               </a14:hiddenFill>
             </a:ext>
             <a:ext uri="{91240B29-F687-4f45-9708-019B960494DF}">
-              <a14:hiddenLine xmlns="" xmlns:a14="http://schemas.microsoft.com/office/drawing/2010/main" w="9525">
+              <a14:hiddenLine xmlns:a14="http://schemas.microsoft.com/office/drawing/2010/main" xmlns="" w="9525">
                 <a:solidFill>
                   <a:srgbClr val="000000"/>
                 </a:solidFill>
@@ -8192,14 +8192,14 @@
           </a:ln>
           <a:extLst>
             <a:ext uri="{909E8E84-426E-40dd-AFC4-6F175D3DCCD1}">
-              <a14:hiddenFill xmlns="" xmlns:a14="http://schemas.microsoft.com/office/drawing/2010/main">
+              <a14:hiddenFill xmlns:a14="http://schemas.microsoft.com/office/drawing/2010/main" xmlns="">
                 <a:solidFill>
                   <a:srgbClr val="FFFFFF"/>
                 </a:solidFill>
               </a14:hiddenFill>
             </a:ext>
             <a:ext uri="{91240B29-F687-4f45-9708-019B960494DF}">
-              <a14:hiddenLine xmlns="" xmlns:a14="http://schemas.microsoft.com/office/drawing/2010/main" w="9525">
+              <a14:hiddenLine xmlns:a14="http://schemas.microsoft.com/office/drawing/2010/main" xmlns="" w="9525">
                 <a:solidFill>
                   <a:srgbClr val="000000"/>
                 </a:solidFill>
@@ -8275,14 +8275,14 @@
           </a:ln>
           <a:extLst>
             <a:ext uri="{909E8E84-426E-40dd-AFC4-6F175D3DCCD1}">
-              <a14:hiddenFill xmlns="" xmlns:a14="http://schemas.microsoft.com/office/drawing/2010/main">
+              <a14:hiddenFill xmlns:a14="http://schemas.microsoft.com/office/drawing/2010/main" xmlns="">
                 <a:solidFill>
                   <a:srgbClr val="FFFFFF"/>
                 </a:solidFill>
               </a14:hiddenFill>
             </a:ext>
             <a:ext uri="{91240B29-F687-4f45-9708-019B960494DF}">
-              <a14:hiddenLine xmlns="" xmlns:a14="http://schemas.microsoft.com/office/drawing/2010/main" w="9525">
+              <a14:hiddenLine xmlns:a14="http://schemas.microsoft.com/office/drawing/2010/main" xmlns="" w="9525">
                 <a:solidFill>
                   <a:srgbClr val="000000"/>
                 </a:solidFill>
@@ -8358,14 +8358,14 @@
           </a:ln>
           <a:extLst>
             <a:ext uri="{909E8E84-426E-40dd-AFC4-6F175D3DCCD1}">
-              <a14:hiddenFill xmlns="" xmlns:a14="http://schemas.microsoft.com/office/drawing/2010/main">
+              <a14:hiddenFill xmlns:a14="http://schemas.microsoft.com/office/drawing/2010/main" xmlns="">
                 <a:solidFill>
                   <a:srgbClr val="FFFFFF"/>
                 </a:solidFill>
               </a14:hiddenFill>
             </a:ext>
             <a:ext uri="{91240B29-F687-4f45-9708-019B960494DF}">
-              <a14:hiddenLine xmlns="" xmlns:a14="http://schemas.microsoft.com/office/drawing/2010/main" w="9525">
+              <a14:hiddenLine xmlns:a14="http://schemas.microsoft.com/office/drawing/2010/main" xmlns="" w="9525">
                 <a:solidFill>
                   <a:srgbClr val="000000"/>
                 </a:solidFill>

</xml_diff>